<commit_message>
Adjust slides for Termin 5 to odp
</commit_message>
<xml_diff>
--- a/Termin_5/folien/UebungModellierung#5.pptx
+++ b/Termin_5/folien/UebungModellierung#5.pptx
@@ -5,10 +5,10 @@
     <p:sldMasterId id="2147483648" r:id="rId1"/>
   </p:sldMasterIdLst>
   <p:notesMasterIdLst>
-    <p:notesMasterId r:id="rId23"/>
+    <p:notesMasterId r:id="rId22"/>
   </p:notesMasterIdLst>
   <p:handoutMasterIdLst>
-    <p:handoutMasterId r:id="rId24"/>
+    <p:handoutMasterId r:id="rId23"/>
   </p:handoutMasterIdLst>
   <p:sldIdLst>
     <p:sldId id="892" r:id="rId2"/>
@@ -31,21 +31,20 @@
     <p:sldId id="1013" r:id="rId19"/>
     <p:sldId id="1016" r:id="rId20"/>
     <p:sldId id="1017" r:id="rId21"/>
-    <p:sldId id="1026" r:id="rId22"/>
   </p:sldIdLst>
   <p:sldSz cx="9144000" cy="6858000" type="screen4x3"/>
   <p:notesSz cx="7099300" cy="9601200"/>
   <p:embeddedFontLst>
     <p:embeddedFont>
       <p:font typeface="Calibri" pitchFamily="34" charset="0"/>
-      <p:regular r:id="rId25"/>
-      <p:bold r:id="rId26"/>
-      <p:italic r:id="rId27"/>
-      <p:boldItalic r:id="rId28"/>
+      <p:regular r:id="rId24"/>
+      <p:bold r:id="rId25"/>
+      <p:italic r:id="rId26"/>
+      <p:boldItalic r:id="rId27"/>
     </p:embeddedFont>
     <p:embeddedFont>
       <p:font typeface="MV Boli" pitchFamily="2" charset="0"/>
-      <p:regular r:id="rId29"/>
+      <p:regular r:id="rId28"/>
     </p:embeddedFont>
   </p:embeddedFontLst>
   <p:defaultTextStyle>
@@ -2228,108 +2227,6 @@
 </p:notes>
 </file>
 
-<file path=ppt/notesSlides/notesSlide21.xml><?xml version="1.0" encoding="utf-8"?>
-<p:notes xmlns:a="http://schemas.openxmlformats.org/drawingml/2006/main" xmlns:r="http://schemas.openxmlformats.org/officeDocument/2006/relationships" xmlns:p="http://schemas.openxmlformats.org/presentationml/2006/main">
-  <p:cSld>
-    <p:spTree>
-      <p:nvGrpSpPr>
-        <p:cNvPr id="1" name=""/>
-        <p:cNvGrpSpPr/>
-        <p:nvPr/>
-      </p:nvGrpSpPr>
-      <p:grpSpPr>
-        <a:xfrm>
-          <a:off x="0" y="0"/>
-          <a:ext cx="0" cy="0"/>
-          <a:chOff x="0" y="0"/>
-          <a:chExt cx="0" cy="0"/>
-        </a:xfrm>
-      </p:grpSpPr>
-      <p:sp>
-        <p:nvSpPr>
-          <p:cNvPr id="54274" name="Rectangle 7"/>
-          <p:cNvSpPr>
-            <a:spLocks noGrp="1" noChangeArrowheads="1"/>
-          </p:cNvSpPr>
-          <p:nvPr>
-            <p:ph type="sldNum" sz="quarter" idx="5"/>
-          </p:nvPr>
-        </p:nvSpPr>
-        <p:spPr/>
-        <p:txBody>
-          <a:bodyPr/>
-          <a:lstStyle/>
-          <a:p>
-            <a:pPr>
-              <a:defRPr/>
-            </a:pPr>
-            <a:fld id="{10FECC1A-FDCF-43AB-8611-DC3836B8FF46}" type="slidenum">
-              <a:rPr lang="de-DE" smtClean="0"/>
-              <a:pPr>
-                <a:defRPr/>
-              </a:pPr>
-              <a:t>21</a:t>
-            </a:fld>
-            <a:endParaRPr lang="de-DE" smtClean="0"/>
-          </a:p>
-        </p:txBody>
-      </p:sp>
-      <p:sp>
-        <p:nvSpPr>
-          <p:cNvPr id="28675" name="Rectangle 2"/>
-          <p:cNvSpPr>
-            <a:spLocks noGrp="1" noRot="1" noChangeAspect="1" noChangeArrowheads="1" noTextEdit="1"/>
-          </p:cNvSpPr>
-          <p:nvPr>
-            <p:ph type="sldImg"/>
-          </p:nvPr>
-        </p:nvSpPr>
-        <p:spPr>
-          <a:xfrm>
-            <a:off x="1152525" y="720725"/>
-            <a:ext cx="4799013" cy="3598863"/>
-          </a:xfrm>
-          <a:ln/>
-        </p:spPr>
-      </p:sp>
-      <p:sp>
-        <p:nvSpPr>
-          <p:cNvPr id="28676" name="Rectangle 3"/>
-          <p:cNvSpPr>
-            <a:spLocks noGrp="1" noChangeArrowheads="1"/>
-          </p:cNvSpPr>
-          <p:nvPr>
-            <p:ph type="body" idx="1"/>
-          </p:nvPr>
-        </p:nvSpPr>
-        <p:spPr>
-          <a:xfrm>
-            <a:off x="946150" y="4559300"/>
-            <a:ext cx="5207000" cy="4321175"/>
-          </a:xfrm>
-          <a:noFill/>
-          <a:ln/>
-        </p:spPr>
-        <p:txBody>
-          <a:bodyPr/>
-          <a:lstStyle/>
-          <a:p>
-            <a:pPr eaLnBrk="1" hangingPunct="1"/>
-            <a:r>
-              <a:rPr lang="en-US" dirty="0" smtClean="0"/>
-              <a:t>This is the main motivation…</a:t>
-            </a:r>
-          </a:p>
-        </p:txBody>
-      </p:sp>
-    </p:spTree>
-  </p:cSld>
-  <p:clrMapOvr>
-    <a:masterClrMapping/>
-  </p:clrMapOvr>
-</p:notes>
-</file>
-
 <file path=ppt/notesSlides/notesSlide3.xml><?xml version="1.0" encoding="utf-8"?>
 <p:notes xmlns:a="http://schemas.openxmlformats.org/drawingml/2006/main" xmlns:r="http://schemas.openxmlformats.org/officeDocument/2006/relationships" xmlns:p="http://schemas.openxmlformats.org/presentationml/2006/main">
   <p:cSld>
@@ -4932,7 +4829,27 @@
                 <a:latin typeface="Calibri" pitchFamily="34" charset="0"/>
                 <a:cs typeface="+mn-cs"/>
               </a:rPr>
-              <a:t>Seminar „Einführung in die Modellierung“, Wintersemester 2016/17                 #</a:t>
+              <a:t>Seminar „Einführung in die Modellierung“			</a:t>
+            </a:r>
+            <a:r>
+              <a:rPr lang="de-DE" baseline="0" noProof="0" dirty="0" smtClean="0">
+                <a:solidFill>
+                  <a:schemeClr val="bg1"/>
+                </a:solidFill>
+                <a:latin typeface="Calibri" pitchFamily="34" charset="0"/>
+                <a:cs typeface="+mn-cs"/>
+              </a:rPr>
+              <a:t>         </a:t>
+            </a:r>
+            <a:r>
+              <a:rPr lang="de-DE" noProof="0" dirty="0" smtClean="0">
+                <a:solidFill>
+                  <a:schemeClr val="bg1"/>
+                </a:solidFill>
+                <a:latin typeface="Calibri" pitchFamily="34" charset="0"/>
+                <a:cs typeface="+mn-cs"/>
+              </a:rPr>
+              <a:t>#</a:t>
             </a:r>
             <a:fld id="{19621714-58BB-457A-826B-841F6E217726}" type="slidenum">
               <a:rPr lang="de-DE" noProof="0" smtClean="0">
@@ -5459,7 +5376,7 @@
               <a:rPr lang="de-DE" sz="3600" dirty="0" smtClean="0">
                 <a:latin typeface="Calibri" pitchFamily="34" charset="0"/>
               </a:rPr>
-              <a:t>Wintersemester 2016/17</a:t>
+              <a:t>Wintersemester 2017/18</a:t>
             </a:r>
           </a:p>
           <a:p>
@@ -22999,12 +22916,12 @@
           <p:nvPr/>
         </p:nvGraphicFramePr>
         <p:xfrm>
-          <a:off x="328811" y="5700713"/>
-          <a:ext cx="3667125" cy="307975"/>
+          <a:off x="323528" y="5589588"/>
+          <a:ext cx="6254750" cy="530225"/>
         </p:xfrm>
         <a:graphic>
           <a:graphicData uri="http://schemas.openxmlformats.org/presentationml/2006/ole">
-            <p:oleObj spid="_x0000_s91144" name="Formel" r:id="rId7" imgW="2717640" imgH="228600" progId="Equation.3">
+            <p:oleObj spid="_x0000_s91144" name="Formel" r:id="rId7" imgW="4635360" imgH="393480" progId="Equation.3">
               <p:embed/>
             </p:oleObj>
           </a:graphicData>
@@ -25335,12 +25252,12 @@
           <p:nvPr/>
         </p:nvGraphicFramePr>
         <p:xfrm>
-          <a:off x="827088" y="5229200"/>
-          <a:ext cx="3118422" cy="312392"/>
+          <a:off x="1403648" y="5229225"/>
+          <a:ext cx="2320925" cy="312738"/>
         </p:xfrm>
         <a:graphic>
           <a:graphicData uri="http://schemas.openxmlformats.org/presentationml/2006/ole">
-            <p:oleObj spid="_x0000_s94213" name="Formel" r:id="rId7" imgW="2286000" imgH="228600" progId="Equation.3">
+            <p:oleObj spid="_x0000_s94213" name="Formel" r:id="rId7" imgW="1701720" imgH="228600" progId="Equation.3">
               <p:embed/>
             </p:oleObj>
           </a:graphicData>
@@ -25355,12 +25272,12 @@
           <p:nvPr/>
         </p:nvGraphicFramePr>
         <p:xfrm>
-          <a:off x="4772025" y="5221288"/>
-          <a:ext cx="2516188" cy="309562"/>
+          <a:off x="4302125" y="5110163"/>
+          <a:ext cx="3457575" cy="533400"/>
         </p:xfrm>
         <a:graphic>
           <a:graphicData uri="http://schemas.openxmlformats.org/presentationml/2006/ole">
-            <p:oleObj spid="_x0000_s94214" name="Formel" r:id="rId8" imgW="1866600" imgH="228600" progId="Equation.3">
+            <p:oleObj spid="_x0000_s94214" name="Formel" r:id="rId8" imgW="2565360" imgH="393480" progId="Equation.3">
               <p:embed/>
             </p:oleObj>
           </a:graphicData>
@@ -26508,7 +26425,7 @@
               <a:rPr lang="de-DE" sz="3600" dirty="0" smtClean="0">
                 <a:latin typeface="Calibri" pitchFamily="34" charset="0"/>
               </a:rPr>
-              <a:t>Wintersemester 2016/17</a:t>
+              <a:t>Wintersemester 2017/18</a:t>
             </a:r>
           </a:p>
           <a:p>
@@ -26919,10 +26836,10 @@
                   </a:solidFill>
                   <a:latin typeface="Calibri" pitchFamily="34" charset="0"/>
                 </a:rPr>
-                <a:t>Implementiere das </a:t>
+                <a:t>Bearbeite die Aufgaben zum </a:t>
               </a:r>
               <a:r>
-                <a:rPr lang="de-DE" i="1" dirty="0" err="1" smtClean="0">
+                <a:rPr lang="de-DE" i="1" smtClean="0">
                   <a:solidFill>
                     <a:schemeClr val="accent5">
                       <a:lumMod val="50000"/>
@@ -26933,6 +26850,17 @@
                 <a:t>abcd</a:t>
               </a:r>
               <a:r>
+                <a:rPr lang="de-DE" smtClean="0">
+                  <a:solidFill>
+                    <a:schemeClr val="accent5">
+                      <a:lumMod val="50000"/>
+                    </a:schemeClr>
+                  </a:solidFill>
+                  <a:latin typeface="Calibri" pitchFamily="34" charset="0"/>
+                </a:rPr>
+                <a:t>-Modell in </a:t>
+              </a:r>
+              <a:r>
                 <a:rPr lang="de-DE" dirty="0" smtClean="0">
                   <a:solidFill>
                     <a:schemeClr val="accent5">
@@ -26941,7 +26869,7 @@
                   </a:solidFill>
                   <a:latin typeface="Calibri" pitchFamily="34" charset="0"/>
                 </a:rPr>
-                <a:t>-Modell als Funktion in R (Datei </a:t>
+                <a:t>R (Datei </a:t>
               </a:r>
               <a:r>
                 <a:rPr lang="de-DE" sz="1400" dirty="0" err="1" smtClean="0">
@@ -28734,686 +28662,6 @@
 </p:sld>
 </file>
 
-<file path=ppt/slides/slide21.xml><?xml version="1.0" encoding="utf-8"?>
-<p:sld xmlns:a="http://schemas.openxmlformats.org/drawingml/2006/main" xmlns:r="http://schemas.openxmlformats.org/officeDocument/2006/relationships" xmlns:p="http://schemas.openxmlformats.org/presentationml/2006/main">
-  <p:cSld>
-    <p:spTree>
-      <p:nvGrpSpPr>
-        <p:cNvPr id="1" name=""/>
-        <p:cNvGrpSpPr/>
-        <p:nvPr/>
-      </p:nvGrpSpPr>
-      <p:grpSpPr>
-        <a:xfrm>
-          <a:off x="0" y="0"/>
-          <a:ext cx="0" cy="0"/>
-          <a:chOff x="0" y="0"/>
-          <a:chExt cx="0" cy="0"/>
-        </a:xfrm>
-      </p:grpSpPr>
-      <p:pic>
-        <p:nvPicPr>
-          <p:cNvPr id="112648" name="Picture 8"/>
-          <p:cNvPicPr>
-            <a:picLocks noChangeAspect="1" noChangeArrowheads="1"/>
-          </p:cNvPicPr>
-          <p:nvPr/>
-        </p:nvPicPr>
-        <p:blipFill>
-          <a:blip r:embed="rId3" cstate="print"/>
-          <a:srcRect/>
-          <a:stretch>
-            <a:fillRect/>
-          </a:stretch>
-        </p:blipFill>
-        <p:spPr bwMode="auto">
-          <a:xfrm>
-            <a:off x="34925" y="1124744"/>
-            <a:ext cx="9101167" cy="5112568"/>
-          </a:xfrm>
-          <a:prstGeom prst="rect">
-            <a:avLst/>
-          </a:prstGeom>
-          <a:noFill/>
-          <a:ln w="9525">
-            <a:noFill/>
-            <a:miter lim="800000"/>
-            <a:headEnd/>
-            <a:tailEnd/>
-          </a:ln>
-        </p:spPr>
-      </p:pic>
-      <p:sp>
-        <p:nvSpPr>
-          <p:cNvPr id="13" name="Textfeld 12"/>
-          <p:cNvSpPr txBox="1"/>
-          <p:nvPr/>
-        </p:nvSpPr>
-        <p:spPr>
-          <a:xfrm>
-            <a:off x="1" y="-21515"/>
-            <a:ext cx="9108504" cy="476250"/>
-          </a:xfrm>
-          <a:prstGeom prst="rect">
-            <a:avLst/>
-          </a:prstGeom>
-          <a:noFill/>
-          <a:effectLst/>
-        </p:spPr>
-        <p:txBody>
-          <a:bodyPr wrap="square" lIns="0" rIns="0" rtlCol="0">
-            <a:noAutofit/>
-          </a:bodyPr>
-          <a:lstStyle/>
-          <a:p>
-            <a:pPr algn="ctr">
-              <a:spcAft>
-                <a:spcPts val="0"/>
-              </a:spcAft>
-              <a:defRPr/>
-            </a:pPr>
-            <a:r>
-              <a:rPr lang="de-DE" sz="2800" dirty="0" smtClean="0">
-                <a:solidFill>
-                  <a:schemeClr val="bg1">
-                    <a:lumMod val="85000"/>
-                  </a:schemeClr>
-                </a:solidFill>
-                <a:latin typeface="Calibri" pitchFamily="34" charset="0"/>
-              </a:rPr>
-              <a:t>MOPEX</a:t>
-            </a:r>
-          </a:p>
-        </p:txBody>
-      </p:sp>
-      <p:sp>
-        <p:nvSpPr>
-          <p:cNvPr id="28" name="Textfeld 27"/>
-          <p:cNvSpPr txBox="1"/>
-          <p:nvPr/>
-        </p:nvSpPr>
-        <p:spPr>
-          <a:xfrm>
-            <a:off x="395288" y="765175"/>
-            <a:ext cx="8209037" cy="523220"/>
-          </a:xfrm>
-          <a:prstGeom prst="rect">
-            <a:avLst/>
-          </a:prstGeom>
-          <a:noFill/>
-        </p:spPr>
-        <p:txBody>
-          <a:bodyPr wrap="square" rtlCol="0">
-            <a:spAutoFit/>
-          </a:bodyPr>
-          <a:lstStyle/>
-          <a:p>
-            <a:r>
-              <a:rPr lang="de-DE" sz="2800" dirty="0" smtClean="0">
-                <a:latin typeface="Calibri" pitchFamily="34" charset="0"/>
-              </a:rPr>
-              <a:t>MOPEX: </a:t>
-            </a:r>
-            <a:r>
-              <a:rPr lang="de-DE" sz="2800" b="1" dirty="0" err="1" smtClean="0">
-                <a:latin typeface="Calibri" pitchFamily="34" charset="0"/>
-              </a:rPr>
-              <a:t>MO</a:t>
-            </a:r>
-            <a:r>
-              <a:rPr lang="de-DE" sz="2800" dirty="0" err="1" smtClean="0">
-                <a:latin typeface="Calibri" pitchFamily="34" charset="0"/>
-              </a:rPr>
-              <a:t>del</a:t>
-            </a:r>
-            <a:r>
-              <a:rPr lang="de-DE" sz="2800" dirty="0" smtClean="0">
-                <a:latin typeface="Calibri" pitchFamily="34" charset="0"/>
-              </a:rPr>
-              <a:t> </a:t>
-            </a:r>
-            <a:r>
-              <a:rPr lang="de-DE" sz="2800" b="1" dirty="0" smtClean="0">
-                <a:latin typeface="Calibri" pitchFamily="34" charset="0"/>
-              </a:rPr>
-              <a:t>P</a:t>
-            </a:r>
-            <a:r>
-              <a:rPr lang="de-DE" sz="2800" dirty="0" smtClean="0">
-                <a:latin typeface="Calibri" pitchFamily="34" charset="0"/>
-              </a:rPr>
-              <a:t>arameter </a:t>
-            </a:r>
-            <a:r>
-              <a:rPr lang="de-DE" sz="2800" b="1" dirty="0" err="1" smtClean="0">
-                <a:latin typeface="Calibri" pitchFamily="34" charset="0"/>
-              </a:rPr>
-              <a:t>E</a:t>
-            </a:r>
-            <a:r>
-              <a:rPr lang="de-DE" sz="2800" dirty="0" err="1" smtClean="0">
-                <a:latin typeface="Calibri" pitchFamily="34" charset="0"/>
-              </a:rPr>
-              <a:t>stimation</a:t>
-            </a:r>
-            <a:r>
-              <a:rPr lang="de-DE" sz="2800" dirty="0" smtClean="0">
-                <a:latin typeface="Calibri" pitchFamily="34" charset="0"/>
-              </a:rPr>
-              <a:t> </a:t>
-            </a:r>
-            <a:r>
-              <a:rPr lang="de-DE" sz="2800" dirty="0" err="1" smtClean="0">
-                <a:latin typeface="Calibri" pitchFamily="34" charset="0"/>
-              </a:rPr>
-              <a:t>E</a:t>
-            </a:r>
-            <a:r>
-              <a:rPr lang="de-DE" sz="2800" b="1" dirty="0" err="1" smtClean="0">
-                <a:latin typeface="Calibri" pitchFamily="34" charset="0"/>
-              </a:rPr>
-              <a:t>X</a:t>
-            </a:r>
-            <a:r>
-              <a:rPr lang="de-DE" sz="2800" dirty="0" err="1" smtClean="0">
-                <a:latin typeface="Calibri" pitchFamily="34" charset="0"/>
-              </a:rPr>
-              <a:t>periment</a:t>
-            </a:r>
-            <a:endParaRPr lang="de-DE" sz="2800" dirty="0">
-              <a:latin typeface="Calibri" pitchFamily="34" charset="0"/>
-            </a:endParaRPr>
-          </a:p>
-        </p:txBody>
-      </p:sp>
-      <p:sp>
-        <p:nvSpPr>
-          <p:cNvPr id="36" name="Textfeld 35"/>
-          <p:cNvSpPr txBox="1"/>
-          <p:nvPr/>
-        </p:nvSpPr>
-        <p:spPr>
-          <a:xfrm>
-            <a:off x="395288" y="1484313"/>
-            <a:ext cx="8569325" cy="1800493"/>
-          </a:xfrm>
-          <a:prstGeom prst="rect">
-            <a:avLst/>
-          </a:prstGeom>
-          <a:solidFill>
-            <a:srgbClr val="FFFFFF">
-              <a:alpha val="50196"/>
-            </a:srgbClr>
-          </a:solidFill>
-        </p:spPr>
-        <p:txBody>
-          <a:bodyPr wrap="square" rtlCol="0">
-            <a:spAutoFit/>
-          </a:bodyPr>
-          <a:lstStyle/>
-          <a:p>
-            <a:pPr marL="355600" indent="-355600">
-              <a:spcAft>
-                <a:spcPts val="600"/>
-              </a:spcAft>
-              <a:buFont typeface="Wingdings" pitchFamily="2" charset="2"/>
-              <a:buChar char="§"/>
-            </a:pPr>
-            <a:r>
-              <a:rPr lang="de-DE" sz="2400" dirty="0" smtClean="0">
-                <a:latin typeface="Calibri" pitchFamily="34" charset="0"/>
-              </a:rPr>
-              <a:t>homogener Datensatz für 431 Einzugsgebiete in den USA</a:t>
-            </a:r>
-          </a:p>
-          <a:p>
-            <a:pPr marL="355600" indent="-355600">
-              <a:spcAft>
-                <a:spcPts val="600"/>
-              </a:spcAft>
-              <a:buFont typeface="Wingdings" pitchFamily="2" charset="2"/>
-              <a:buChar char="§"/>
-            </a:pPr>
-            <a:r>
-              <a:rPr lang="de-DE" sz="2400" dirty="0" smtClean="0">
-                <a:latin typeface="Calibri" pitchFamily="34" charset="0"/>
-              </a:rPr>
-              <a:t>Abflusszeitreihen</a:t>
-            </a:r>
-          </a:p>
-          <a:p>
-            <a:pPr marL="355600" indent="-355600">
-              <a:spcAft>
-                <a:spcPts val="600"/>
-              </a:spcAft>
-              <a:buFont typeface="Wingdings" pitchFamily="2" charset="2"/>
-              <a:buChar char="§"/>
-            </a:pPr>
-            <a:r>
-              <a:rPr lang="de-DE" sz="2400" dirty="0" smtClean="0">
-                <a:latin typeface="Calibri" pitchFamily="34" charset="0"/>
-              </a:rPr>
-              <a:t>Gebietsmittelwerte für Niederschlag, PET, </a:t>
-            </a:r>
-            <a:r>
-              <a:rPr lang="de-DE" sz="2400" dirty="0" err="1" smtClean="0">
-                <a:latin typeface="Calibri" pitchFamily="34" charset="0"/>
-              </a:rPr>
-              <a:t>T</a:t>
-            </a:r>
-            <a:r>
-              <a:rPr lang="de-DE" sz="2400" baseline="-25000" dirty="0" err="1" smtClean="0">
-                <a:latin typeface="Calibri" pitchFamily="34" charset="0"/>
-              </a:rPr>
-              <a:t>min</a:t>
-            </a:r>
-            <a:r>
-              <a:rPr lang="de-DE" sz="2400" dirty="0" smtClean="0">
-                <a:latin typeface="Calibri" pitchFamily="34" charset="0"/>
-              </a:rPr>
-              <a:t>, </a:t>
-            </a:r>
-            <a:r>
-              <a:rPr lang="de-DE" sz="2400" dirty="0" err="1" smtClean="0">
-                <a:latin typeface="Calibri" pitchFamily="34" charset="0"/>
-              </a:rPr>
-              <a:t>T</a:t>
-            </a:r>
-            <a:r>
-              <a:rPr lang="de-DE" sz="2400" baseline="-25000" dirty="0" err="1" smtClean="0">
-                <a:latin typeface="Calibri" pitchFamily="34" charset="0"/>
-              </a:rPr>
-              <a:t>max</a:t>
-            </a:r>
-            <a:endParaRPr lang="de-DE" sz="2400" baseline="-25000" dirty="0" smtClean="0">
-              <a:latin typeface="Calibri" pitchFamily="34" charset="0"/>
-            </a:endParaRPr>
-          </a:p>
-          <a:p>
-            <a:pPr marL="355600" indent="-355600">
-              <a:spcAft>
-                <a:spcPts val="600"/>
-              </a:spcAft>
-              <a:buFont typeface="Wingdings" pitchFamily="2" charset="2"/>
-              <a:buChar char="§"/>
-            </a:pPr>
-            <a:r>
-              <a:rPr lang="de-DE" sz="2400" dirty="0" smtClean="0">
-                <a:latin typeface="Calibri" pitchFamily="34" charset="0"/>
-              </a:rPr>
-              <a:t>tägliche Auflösung (für diesen Kurs: Monatsmittelwerte)</a:t>
-            </a:r>
-          </a:p>
-        </p:txBody>
-      </p:sp>
-      <p:sp>
-        <p:nvSpPr>
-          <p:cNvPr id="43" name="Textfeld 42"/>
-          <p:cNvSpPr txBox="1"/>
-          <p:nvPr/>
-        </p:nvSpPr>
-        <p:spPr>
-          <a:xfrm>
-            <a:off x="0" y="4243154"/>
-            <a:ext cx="9144000" cy="553998"/>
-          </a:xfrm>
-          <a:prstGeom prst="rect">
-            <a:avLst/>
-          </a:prstGeom>
-          <a:solidFill>
-            <a:srgbClr val="FFFFFF">
-              <a:alpha val="50196"/>
-            </a:srgbClr>
-          </a:solidFill>
-        </p:spPr>
-        <p:txBody>
-          <a:bodyPr wrap="square" rtlCol="0">
-            <a:spAutoFit/>
-          </a:bodyPr>
-          <a:lstStyle/>
-          <a:p>
-            <a:pPr algn="ctr"/>
-            <a:r>
-              <a:rPr lang="de-DE" sz="3000" dirty="0" smtClean="0">
-                <a:latin typeface="Calibri" pitchFamily="34" charset="0"/>
-                <a:hlinkClick r:id="rId4"/>
-              </a:rPr>
-              <a:t>ftp://hydrology.nws.noaa.gov/pub/gcip/mopex/US_Data</a:t>
-            </a:r>
-            <a:r>
-              <a:rPr lang="de-DE" sz="3000" dirty="0" smtClean="0">
-                <a:latin typeface="Calibri" pitchFamily="34" charset="0"/>
-              </a:rPr>
-              <a:t> </a:t>
-            </a:r>
-            <a:endParaRPr lang="de-DE" sz="3000" dirty="0">
-              <a:latin typeface="Calibri" pitchFamily="34" charset="0"/>
-            </a:endParaRPr>
-          </a:p>
-        </p:txBody>
-      </p:sp>
-      <p:sp>
-        <p:nvSpPr>
-          <p:cNvPr id="44" name="Textfeld 43"/>
-          <p:cNvSpPr txBox="1"/>
-          <p:nvPr/>
-        </p:nvSpPr>
-        <p:spPr>
-          <a:xfrm>
-            <a:off x="0" y="3717032"/>
-            <a:ext cx="9144000" cy="553998"/>
-          </a:xfrm>
-          <a:prstGeom prst="rect">
-            <a:avLst/>
-          </a:prstGeom>
-          <a:solidFill>
-            <a:srgbClr val="FFFFFF">
-              <a:alpha val="50196"/>
-            </a:srgbClr>
-          </a:solidFill>
-        </p:spPr>
-        <p:txBody>
-          <a:bodyPr wrap="square" rtlCol="0">
-            <a:spAutoFit/>
-          </a:bodyPr>
-          <a:lstStyle/>
-          <a:p>
-            <a:pPr algn="ctr"/>
-            <a:r>
-              <a:rPr lang="de-DE" sz="3000" dirty="0" smtClean="0">
-                <a:latin typeface="Calibri" pitchFamily="34" charset="0"/>
-              </a:rPr>
-              <a:t>Download der Daten und Metadaten: </a:t>
-            </a:r>
-            <a:endParaRPr lang="de-DE" sz="3000" dirty="0">
-              <a:latin typeface="Calibri" pitchFamily="34" charset="0"/>
-            </a:endParaRPr>
-          </a:p>
-        </p:txBody>
-      </p:sp>
-      <p:grpSp>
-        <p:nvGrpSpPr>
-          <p:cNvPr id="8" name="Gruppieren 7"/>
-          <p:cNvGrpSpPr/>
-          <p:nvPr/>
-        </p:nvGrpSpPr>
-        <p:grpSpPr>
-          <a:xfrm>
-            <a:off x="179512" y="5589240"/>
-            <a:ext cx="8793686" cy="511579"/>
-            <a:chOff x="278305" y="5589240"/>
-            <a:chExt cx="8793686" cy="511579"/>
-          </a:xfrm>
-        </p:grpSpPr>
-        <p:sp>
-          <p:nvSpPr>
-            <p:cNvPr id="9" name="Text Box 4"/>
-            <p:cNvSpPr txBox="1">
-              <a:spLocks noChangeArrowheads="1"/>
-            </p:cNvSpPr>
-            <p:nvPr/>
-          </p:nvSpPr>
-          <p:spPr bwMode="auto">
-            <a:xfrm>
-              <a:off x="827584" y="5690257"/>
-              <a:ext cx="8244407" cy="369332"/>
-            </a:xfrm>
-            <a:prstGeom prst="rect">
-              <a:avLst/>
-            </a:prstGeom>
-            <a:solidFill>
-              <a:schemeClr val="bg1"/>
-            </a:solidFill>
-            <a:ln w="9525">
-              <a:noFill/>
-              <a:miter lim="800000"/>
-              <a:headEnd/>
-              <a:tailEnd/>
-            </a:ln>
-          </p:spPr>
-          <p:txBody>
-            <a:bodyPr wrap="square">
-              <a:spAutoFit/>
-            </a:bodyPr>
-            <a:lstStyle/>
-            <a:p>
-              <a:pPr>
-                <a:buClr>
-                  <a:schemeClr val="bg2"/>
-                </a:buClr>
-              </a:pPr>
-              <a:r>
-                <a:rPr lang="de-DE" sz="1800" dirty="0" smtClean="0">
-                  <a:solidFill>
-                    <a:schemeClr val="accent5">
-                      <a:lumMod val="50000"/>
-                    </a:schemeClr>
-                  </a:solidFill>
-                  <a:latin typeface="Calibri" pitchFamily="34" charset="0"/>
-                </a:rPr>
-                <a:t>Einlesen und Darstellen einer Beispieldatei mit R (Datei </a:t>
-              </a:r>
-              <a:r>
-                <a:rPr lang="de-DE" dirty="0" err="1" smtClean="0">
-                  <a:solidFill>
-                    <a:schemeClr val="accent5">
-                      <a:lumMod val="50000"/>
-                    </a:schemeClr>
-                  </a:solidFill>
-                  <a:latin typeface="Courier New" pitchFamily="49" charset="0"/>
-                  <a:cs typeface="Courier New" pitchFamily="49" charset="0"/>
-                </a:rPr>
-                <a:t>abcd.R</a:t>
-              </a:r>
-              <a:r>
-                <a:rPr lang="de-DE" sz="1800" dirty="0" smtClean="0">
-                  <a:solidFill>
-                    <a:schemeClr val="accent5">
-                      <a:lumMod val="50000"/>
-                    </a:schemeClr>
-                  </a:solidFill>
-                  <a:latin typeface="Calibri" pitchFamily="34" charset="0"/>
-                </a:rPr>
-                <a:t>).</a:t>
-              </a:r>
-              <a:endParaRPr lang="de-DE" sz="1800" baseline="-25000" dirty="0">
-                <a:solidFill>
-                  <a:schemeClr val="accent5">
-                    <a:lumMod val="50000"/>
-                  </a:schemeClr>
-                </a:solidFill>
-                <a:latin typeface="Calibri" pitchFamily="34" charset="0"/>
-              </a:endParaRPr>
-            </a:p>
-          </p:txBody>
-        </p:sp>
-        <p:pic>
-          <p:nvPicPr>
-            <p:cNvPr id="10" name="Picture 8"/>
-            <p:cNvPicPr>
-              <a:picLocks noChangeAspect="1" noChangeArrowheads="1"/>
-            </p:cNvPicPr>
-            <p:nvPr/>
-          </p:nvPicPr>
-          <p:blipFill>
-            <a:blip r:embed="rId5" cstate="print"/>
-            <a:srcRect/>
-            <a:stretch>
-              <a:fillRect/>
-            </a:stretch>
-          </p:blipFill>
-          <p:spPr bwMode="auto">
-            <a:xfrm>
-              <a:off x="278305" y="5589240"/>
-              <a:ext cx="574997" cy="511579"/>
-            </a:xfrm>
-            <a:prstGeom prst="rect">
-              <a:avLst/>
-            </a:prstGeom>
-            <a:noFill/>
-            <a:ln w="9525">
-              <a:noFill/>
-              <a:miter lim="800000"/>
-              <a:headEnd/>
-              <a:tailEnd/>
-            </a:ln>
-            <a:effectLst/>
-          </p:spPr>
-        </p:pic>
-      </p:grpSp>
-    </p:spTree>
-  </p:cSld>
-  <p:clrMapOvr>
-    <a:masterClrMapping/>
-  </p:clrMapOvr>
-  <p:transition>
-    <p:split/>
-  </p:transition>
-  <p:timing>
-    <p:tnLst>
-      <p:par>
-        <p:cTn id="1" dur="indefinite" restart="never" nodeType="tmRoot">
-          <p:childTnLst>
-            <p:seq concurrent="1" nextAc="seek">
-              <p:cTn id="2" dur="indefinite" nodeType="mainSeq">
-                <p:childTnLst>
-                  <p:par>
-                    <p:cTn id="3" fill="hold">
-                      <p:stCondLst>
-                        <p:cond delay="indefinite"/>
-                        <p:cond evt="onBegin" delay="0">
-                          <p:tn val="2"/>
-                        </p:cond>
-                      </p:stCondLst>
-                      <p:childTnLst>
-                        <p:par>
-                          <p:cTn id="4" fill="hold">
-                            <p:stCondLst>
-                              <p:cond delay="0"/>
-                            </p:stCondLst>
-                            <p:childTnLst>
-                              <p:par>
-                                <p:cTn id="5" presetID="9" presetClass="entr" presetSubtype="0" fill="hold" grpId="0" nodeType="withEffect">
-                                  <p:stCondLst>
-                                    <p:cond delay="0"/>
-                                  </p:stCondLst>
-                                  <p:childTnLst>
-                                    <p:set>
-                                      <p:cBhvr>
-                                        <p:cTn id="6" dur="1" fill="hold">
-                                          <p:stCondLst>
-                                            <p:cond delay="0"/>
-                                          </p:stCondLst>
-                                        </p:cTn>
-                                        <p:tgtEl>
-                                          <p:spTgt spid="36"/>
-                                        </p:tgtEl>
-                                        <p:attrNameLst>
-                                          <p:attrName>style.visibility</p:attrName>
-                                        </p:attrNameLst>
-                                      </p:cBhvr>
-                                      <p:to>
-                                        <p:strVal val="visible"/>
-                                      </p:to>
-                                    </p:set>
-                                    <p:animEffect transition="in" filter="dissolve">
-                                      <p:cBhvr>
-                                        <p:cTn id="7" dur="500"/>
-                                        <p:tgtEl>
-                                          <p:spTgt spid="36"/>
-                                        </p:tgtEl>
-                                      </p:cBhvr>
-                                    </p:animEffect>
-                                  </p:childTnLst>
-                                </p:cTn>
-                              </p:par>
-                            </p:childTnLst>
-                          </p:cTn>
-                        </p:par>
-                      </p:childTnLst>
-                    </p:cTn>
-                  </p:par>
-                  <p:par>
-                    <p:cTn id="8" fill="hold">
-                      <p:stCondLst>
-                        <p:cond delay="indefinite"/>
-                      </p:stCondLst>
-                      <p:childTnLst>
-                        <p:par>
-                          <p:cTn id="9" fill="hold">
-                            <p:stCondLst>
-                              <p:cond delay="0"/>
-                            </p:stCondLst>
-                            <p:childTnLst>
-                              <p:par>
-                                <p:cTn id="10" presetID="22" presetClass="entr" presetSubtype="8" fill="hold" nodeType="clickEffect">
-                                  <p:stCondLst>
-                                    <p:cond delay="0"/>
-                                  </p:stCondLst>
-                                  <p:childTnLst>
-                                    <p:set>
-                                      <p:cBhvr>
-                                        <p:cTn id="11" dur="1" fill="hold">
-                                          <p:stCondLst>
-                                            <p:cond delay="0"/>
-                                          </p:stCondLst>
-                                        </p:cTn>
-                                        <p:tgtEl>
-                                          <p:spTgt spid="8"/>
-                                        </p:tgtEl>
-                                        <p:attrNameLst>
-                                          <p:attrName>style.visibility</p:attrName>
-                                        </p:attrNameLst>
-                                      </p:cBhvr>
-                                      <p:to>
-                                        <p:strVal val="visible"/>
-                                      </p:to>
-                                    </p:set>
-                                    <p:animEffect transition="in" filter="wipe(left)">
-                                      <p:cBhvr>
-                                        <p:cTn id="12" dur="500"/>
-                                        <p:tgtEl>
-                                          <p:spTgt spid="8"/>
-                                        </p:tgtEl>
-                                      </p:cBhvr>
-                                    </p:animEffect>
-                                  </p:childTnLst>
-                                </p:cTn>
-                              </p:par>
-                            </p:childTnLst>
-                          </p:cTn>
-                        </p:par>
-                      </p:childTnLst>
-                    </p:cTn>
-                  </p:par>
-                </p:childTnLst>
-              </p:cTn>
-              <p:prevCondLst>
-                <p:cond evt="onPrev" delay="0">
-                  <p:tgtEl>
-                    <p:sldTgt/>
-                  </p:tgtEl>
-                </p:cond>
-              </p:prevCondLst>
-              <p:nextCondLst>
-                <p:cond evt="onNext" delay="0">
-                  <p:tgtEl>
-                    <p:sldTgt/>
-                  </p:tgtEl>
-                </p:cond>
-              </p:nextCondLst>
-            </p:seq>
-          </p:childTnLst>
-        </p:cTn>
-      </p:par>
-    </p:tnLst>
-    <p:bldLst>
-      <p:bldP spid="36" grpId="0" animBg="1"/>
-    </p:bldLst>
-  </p:timing>
-</p:sld>
-</file>
-
 <file path=ppt/slides/slide3.xml><?xml version="1.0" encoding="utf-8"?>
 <p:sld xmlns:a="http://schemas.openxmlformats.org/drawingml/2006/main" xmlns:r="http://schemas.openxmlformats.org/officeDocument/2006/relationships" xmlns:p="http://schemas.openxmlformats.org/presentationml/2006/main" showMasterSp="0">
   <p:cSld>
@@ -29462,7 +28710,7 @@
               <a:rPr lang="de-DE" sz="3600" dirty="0" smtClean="0">
                 <a:latin typeface="Calibri" pitchFamily="34" charset="0"/>
               </a:rPr>
-              <a:t>Wintersemester 2016/17</a:t>
+              <a:t>Wintersemester 2017/18</a:t>
             </a:r>
           </a:p>
           <a:p>
@@ -29645,7 +28893,7 @@
         <p:spPr>
           <a:xfrm>
             <a:off x="1" y="2276872"/>
-            <a:ext cx="9108504" cy="2246769"/>
+            <a:ext cx="9108504" cy="1800493"/>
           </a:xfrm>
           <a:prstGeom prst="rect">
             <a:avLst/>
@@ -29682,13 +28930,7 @@
               <a:rPr lang="de-DE" sz="2400" dirty="0" smtClean="0">
                 <a:latin typeface="Calibri" pitchFamily="34" charset="0"/>
               </a:rPr>
-              <a:t>Rekapitulation: </a:t>
-            </a:r>
-            <a:r>
-              <a:rPr lang="de-DE" sz="2400" i="1" dirty="0" smtClean="0">
-                <a:latin typeface="Calibri" pitchFamily="34" charset="0"/>
-              </a:rPr>
-              <a:t>Wasserhaushaltsmodelle</a:t>
+              <a:t>Rekapitulation</a:t>
             </a:r>
           </a:p>
           <a:p>
@@ -29711,23 +28953,10 @@
               </a:spcAft>
             </a:pPr>
             <a:r>
-              <a:rPr lang="de-DE" sz="2400" dirty="0" smtClean="0">
-                <a:latin typeface="Calibri" pitchFamily="34" charset="0"/>
-              </a:rPr>
-              <a:t>Der MOPEX-Datensatz</a:t>
-            </a:r>
-          </a:p>
-          <a:p>
-            <a:pPr marL="269875" indent="-269875" algn="ctr">
-              <a:spcAft>
-                <a:spcPts val="600"/>
-              </a:spcAft>
-            </a:pPr>
-            <a:r>
               <a:rPr lang="en-GB" sz="2400" dirty="0" err="1" smtClean="0">
                 <a:latin typeface="Calibri" pitchFamily="34" charset="0"/>
               </a:rPr>
-              <a:t>Routinekämpfe</a:t>
+              <a:t>Codefight</a:t>
             </a:r>
             <a:endParaRPr lang="en-GB" sz="2400" dirty="0" smtClean="0">
               <a:latin typeface="Calibri" pitchFamily="34" charset="0"/>
@@ -29810,14 +29039,6 @@
               </a:rPr>
               <a:t>Wasserhaushaltsmodelle (Wiederholung)</a:t>
             </a:r>
-            <a:endParaRPr lang="de-DE" sz="2800" dirty="0" smtClean="0">
-              <a:solidFill>
-                <a:schemeClr val="bg1">
-                  <a:lumMod val="85000"/>
-                </a:schemeClr>
-              </a:solidFill>
-              <a:latin typeface="Calibri" pitchFamily="34" charset="0"/>
-            </a:endParaRPr>
           </a:p>
         </p:txBody>
       </p:sp>
@@ -30694,14 +29915,6 @@
               </a:rPr>
               <a:t>Wasserhaushaltsmodelle (Wiederholung)</a:t>
             </a:r>
-            <a:endParaRPr lang="de-DE" sz="2800" dirty="0" smtClean="0">
-              <a:solidFill>
-                <a:schemeClr val="bg1">
-                  <a:lumMod val="85000"/>
-                </a:schemeClr>
-              </a:solidFill>
-              <a:latin typeface="Calibri" pitchFamily="34" charset="0"/>
-            </a:endParaRPr>
           </a:p>
         </p:txBody>
       </p:sp>
@@ -32817,14 +32030,6 @@
               </a:rPr>
               <a:t>Wasserhaushaltsmodelle (Wiederholung)</a:t>
             </a:r>
-            <a:endParaRPr lang="de-DE" sz="2800" dirty="0" smtClean="0">
-              <a:solidFill>
-                <a:schemeClr val="bg1">
-                  <a:lumMod val="85000"/>
-                </a:schemeClr>
-              </a:solidFill>
-              <a:latin typeface="Calibri" pitchFamily="34" charset="0"/>
-            </a:endParaRPr>
           </a:p>
         </p:txBody>
       </p:sp>
@@ -34530,14 +33735,6 @@
               </a:rPr>
               <a:t>Wasserhaushaltsmodelle (Wiederholung)</a:t>
             </a:r>
-            <a:endParaRPr lang="de-DE" sz="2800" dirty="0" smtClean="0">
-              <a:solidFill>
-                <a:schemeClr val="bg1">
-                  <a:lumMod val="85000"/>
-                </a:schemeClr>
-              </a:solidFill>
-              <a:latin typeface="Calibri" pitchFamily="34" charset="0"/>
-            </a:endParaRPr>
           </a:p>
         </p:txBody>
       </p:sp>

</xml_diff>